<commit_message>
updated escape game slides
</commit_message>
<xml_diff>
--- a/Feb 19 ACMW meeting.pptx
+++ b/Feb 19 ACMW meeting.pptx
@@ -299,7 +299,7 @@
           <a:p>
             <a:fld id="{1160EA64-D806-43AC-9DF2-F8C432F32B4C}" type="datetimeFigureOut">
               <a:rPr lang="en-US" dirty="0"/>
-              <a:t>2/18/2018</a:t>
+              <a:t>2/19/2018</a:t>
             </a:fld>
             <a:endParaRPr lang="en-US"/>
           </a:p>
@@ -463,7 +463,7 @@
           <a:p>
             <a:fld id="{E9F9C37B-1D36-470B-8223-D6C91242EC14}" type="datetimeFigureOut">
               <a:rPr lang="en-US" dirty="0"/>
-              <a:t>2/18/2018</a:t>
+              <a:t>2/19/2018</a:t>
             </a:fld>
             <a:endParaRPr lang="en-US"/>
           </a:p>
@@ -636,7 +636,7 @@
           <a:p>
             <a:fld id="{67C6F52A-A82B-47A2-A83A-8C4C91F2D59F}" type="datetimeFigureOut">
               <a:rPr lang="en-US" dirty="0"/>
-              <a:t>2/18/2018</a:t>
+              <a:t>2/19/2018</a:t>
             </a:fld>
             <a:endParaRPr lang="en-US"/>
           </a:p>
@@ -799,7 +799,7 @@
           <a:p>
             <a:fld id="{F070A7B3-6521-4DCA-87E5-044747A908C1}" type="datetimeFigureOut">
               <a:rPr lang="en-US" dirty="0"/>
-              <a:t>2/18/2018</a:t>
+              <a:t>2/19/2018</a:t>
             </a:fld>
             <a:endParaRPr lang="en-US"/>
           </a:p>
@@ -1062,7 +1062,7 @@
           <a:p>
             <a:fld id="{1160EA64-D806-43AC-9DF2-F8C432F32B4C}" type="datetimeFigureOut">
               <a:rPr lang="en-US" dirty="0"/>
-              <a:t>2/18/2018</a:t>
+              <a:t>2/19/2018</a:t>
             </a:fld>
             <a:endParaRPr lang="en-US"/>
           </a:p>
@@ -1287,7 +1287,7 @@
           <a:p>
             <a:fld id="{AB134690-1557-4C89-A502-4959FE7FAD70}" type="datetimeFigureOut">
               <a:rPr lang="en-US" dirty="0"/>
-              <a:t>2/18/2018</a:t>
+              <a:t>2/19/2018</a:t>
             </a:fld>
             <a:endParaRPr lang="en-US"/>
           </a:p>
@@ -1639,7 +1639,7 @@
           <a:p>
             <a:fld id="{4F7D4976-E339-4826-83B7-FBD03F55ECF8}" type="datetimeFigureOut">
               <a:rPr lang="en-US" dirty="0"/>
-              <a:t>2/18/2018</a:t>
+              <a:t>2/19/2018</a:t>
             </a:fld>
             <a:endParaRPr lang="en-US"/>
           </a:p>
@@ -1773,7 +1773,7 @@
           <a:p>
             <a:fld id="{E1037C31-9E7A-4F99-8774-A0E530DE1A42}" type="datetimeFigureOut">
               <a:rPr lang="en-US" dirty="0"/>
-              <a:t>2/18/2018</a:t>
+              <a:t>2/19/2018</a:t>
             </a:fld>
             <a:endParaRPr lang="en-US"/>
           </a:p>
@@ -1863,7 +1863,7 @@
           <a:p>
             <a:fld id="{C278504F-A551-4DE0-9316-4DCD1D8CC752}" type="datetimeFigureOut">
               <a:rPr lang="en-US" dirty="0"/>
-              <a:t>2/18/2018</a:t>
+              <a:t>2/19/2018</a:t>
             </a:fld>
             <a:endParaRPr lang="en-US"/>
           </a:p>
@@ -2213,7 +2213,7 @@
           <a:p>
             <a:fld id="{D1BE4249-C0D0-4B06-8692-E8BB871AF643}" type="datetimeFigureOut">
               <a:rPr lang="en-US" dirty="0"/>
-              <a:t>2/18/2018</a:t>
+              <a:t>2/19/2018</a:t>
             </a:fld>
             <a:endParaRPr lang="en-US"/>
           </a:p>
@@ -2563,7 +2563,7 @@
           <a:p>
             <a:fld id="{042B0DB6-F5C7-45FB-8CF3-31B45F9C2DAC}" type="datetimeFigureOut">
               <a:rPr lang="en-US" dirty="0"/>
-              <a:t>2/18/2018</a:t>
+              <a:t>2/19/2018</a:t>
             </a:fld>
             <a:endParaRPr lang="en-US"/>
           </a:p>
@@ -2798,7 +2798,7 @@
           <a:p>
             <a:fld id="{1160EA64-D806-43AC-9DF2-F8C432F32B4C}" type="datetimeFigureOut">
               <a:rPr lang="en-US" dirty="0"/>
-              <a:t>2/18/2018</a:t>
+              <a:t>2/19/2018</a:t>
             </a:fld>
             <a:endParaRPr lang="en-US"/>
           </a:p>
@@ -4255,6 +4255,9 @@
                     <p:cTn id="3" fill="hold">
                       <p:stCondLst>
                         <p:cond delay="indefinite"/>
+                        <p:cond evt="onBegin" delay="0">
+                          <p:tn val="2"/>
+                        </p:cond>
                       </p:stCondLst>
                       <p:childTnLst>
                         <p:par>
@@ -4264,7 +4267,7 @@
                             </p:stCondLst>
                             <p:childTnLst>
                               <p:par>
-                                <p:cTn id="5" presetID="1" presetClass="entr" presetSubtype="0" fill="hold" grpId="0" nodeType="clickEffect">
+                                <p:cTn id="5" presetID="1" presetClass="entr" presetSubtype="0" fill="hold" grpId="0" nodeType="withEffect">
                                   <p:stCondLst>
                                     <p:cond delay="0"/>
                                   </p:stCondLst>
@@ -4294,6 +4297,37 @@
                                   </p:childTnLst>
                                 </p:cTn>
                               </p:par>
+                              <p:par>
+                                <p:cTn id="7" presetID="1" presetClass="entr" presetSubtype="0" fill="hold" grpId="0" nodeType="withEffect">
+                                  <p:stCondLst>
+                                    <p:cond delay="0"/>
+                                  </p:stCondLst>
+                                  <p:childTnLst>
+                                    <p:set>
+                                      <p:cBhvr>
+                                        <p:cTn id="8" dur="1" fill="hold">
+                                          <p:stCondLst>
+                                            <p:cond delay="0"/>
+                                          </p:stCondLst>
+                                        </p:cTn>
+                                        <p:tgtEl>
+                                          <p:spTgt spid="3">
+                                            <p:txEl>
+                                              <p:pRg st="7" end="7"/>
+                                            </p:txEl>
+                                          </p:spTgt>
+                                        </p:tgtEl>
+                                        <p:attrNameLst>
+                                          <p:attrName>style.visibility</p:attrName>
+                                        </p:attrNameLst>
+                                      </p:cBhvr>
+                                      <p:to>
+                                        <p:strVal val="visible"/>
+                                      </p:to>
+                                    </p:set>
+                                  </p:childTnLst>
+                                </p:cTn>
+                              </p:par>
                             </p:childTnLst>
                           </p:cTn>
                         </p:par>
@@ -4301,26 +4335,26 @@
                     </p:cTn>
                   </p:par>
                   <p:par>
-                    <p:cTn id="7" fill="hold">
+                    <p:cTn id="9" fill="hold">
                       <p:stCondLst>
                         <p:cond delay="indefinite"/>
                       </p:stCondLst>
                       <p:childTnLst>
                         <p:par>
-                          <p:cTn id="8" fill="hold">
+                          <p:cTn id="10" fill="hold">
                             <p:stCondLst>
                               <p:cond delay="0"/>
                             </p:stCondLst>
                             <p:childTnLst>
                               <p:par>
-                                <p:cTn id="9" presetID="1" presetClass="entr" presetSubtype="0" fill="hold" grpId="0" nodeType="clickEffect">
+                                <p:cTn id="11" presetID="1" presetClass="entr" presetSubtype="0" fill="hold" grpId="0" nodeType="clickEffect">
                                   <p:stCondLst>
                                     <p:cond delay="0"/>
                                   </p:stCondLst>
                                   <p:childTnLst>
                                     <p:set>
                                       <p:cBhvr>
-                                        <p:cTn id="10" dur="1" fill="hold">
+                                        <p:cTn id="12" dur="1" fill="hold">
                                           <p:stCondLst>
                                             <p:cond delay="0"/>
                                           </p:stCondLst>
@@ -4343,26 +4377,8 @@
                                   </p:childTnLst>
                                 </p:cTn>
                               </p:par>
-                            </p:childTnLst>
-                          </p:cTn>
-                        </p:par>
-                      </p:childTnLst>
-                    </p:cTn>
-                  </p:par>
-                  <p:par>
-                    <p:cTn id="11" fill="hold">
-                      <p:stCondLst>
-                        <p:cond delay="indefinite"/>
-                      </p:stCondLst>
-                      <p:childTnLst>
-                        <p:par>
-                          <p:cTn id="12" fill="hold">
-                            <p:stCondLst>
-                              <p:cond delay="0"/>
-                            </p:stCondLst>
-                            <p:childTnLst>
                               <p:par>
-                                <p:cTn id="13" presetID="1" presetClass="entr" presetSubtype="0" fill="hold" grpId="0" nodeType="clickEffect">
+                                <p:cTn id="13" presetID="1" presetClass="entr" presetSubtype="0" fill="hold" grpId="0" nodeType="withEffect">
                                   <p:stCondLst>
                                     <p:cond delay="0"/>
                                   </p:stCondLst>
@@ -4377,7 +4393,7 @@
                                         <p:tgtEl>
                                           <p:spTgt spid="3">
                                             <p:txEl>
-                                              <p:pRg st="2" end="2"/>
+                                              <p:pRg st="8" end="8"/>
                                             </p:txEl>
                                           </p:spTgt>
                                         </p:tgtEl>
@@ -4426,7 +4442,38 @@
                                         <p:tgtEl>
                                           <p:spTgt spid="3">
                                             <p:txEl>
-                                              <p:pRg st="3" end="3"/>
+                                              <p:pRg st="2" end="2"/>
+                                            </p:txEl>
+                                          </p:spTgt>
+                                        </p:tgtEl>
+                                        <p:attrNameLst>
+                                          <p:attrName>style.visibility</p:attrName>
+                                        </p:attrNameLst>
+                                      </p:cBhvr>
+                                      <p:to>
+                                        <p:strVal val="visible"/>
+                                      </p:to>
+                                    </p:set>
+                                  </p:childTnLst>
+                                </p:cTn>
+                              </p:par>
+                              <p:par>
+                                <p:cTn id="19" presetID="1" presetClass="entr" presetSubtype="0" fill="hold" grpId="0" nodeType="withEffect">
+                                  <p:stCondLst>
+                                    <p:cond delay="0"/>
+                                  </p:stCondLst>
+                                  <p:childTnLst>
+                                    <p:set>
+                                      <p:cBhvr>
+                                        <p:cTn id="20" dur="1" fill="hold">
+                                          <p:stCondLst>
+                                            <p:cond delay="0"/>
+                                          </p:stCondLst>
+                                        </p:cTn>
+                                        <p:tgtEl>
+                                          <p:spTgt spid="3">
+                                            <p:txEl>
+                                              <p:pRg st="9" end="9"/>
                                             </p:txEl>
                                           </p:spTgt>
                                         </p:tgtEl>
@@ -4448,26 +4495,26 @@
                     </p:cTn>
                   </p:par>
                   <p:par>
-                    <p:cTn id="19" fill="hold">
+                    <p:cTn id="21" fill="hold">
                       <p:stCondLst>
                         <p:cond delay="indefinite"/>
                       </p:stCondLst>
                       <p:childTnLst>
                         <p:par>
-                          <p:cTn id="20" fill="hold">
+                          <p:cTn id="22" fill="hold">
                             <p:stCondLst>
                               <p:cond delay="0"/>
                             </p:stCondLst>
                             <p:childTnLst>
                               <p:par>
-                                <p:cTn id="21" presetID="1" presetClass="entr" presetSubtype="0" fill="hold" grpId="0" nodeType="clickEffect">
+                                <p:cTn id="23" presetID="1" presetClass="entr" presetSubtype="0" fill="hold" grpId="0" nodeType="clickEffect">
                                   <p:stCondLst>
                                     <p:cond delay="0"/>
                                   </p:stCondLst>
                                   <p:childTnLst>
                                     <p:set>
                                       <p:cBhvr>
-                                        <p:cTn id="22" dur="1" fill="hold">
+                                        <p:cTn id="24" dur="1" fill="hold">
                                           <p:stCondLst>
                                             <p:cond delay="0"/>
                                           </p:stCondLst>
@@ -4475,7 +4522,7 @@
                                         <p:tgtEl>
                                           <p:spTgt spid="3">
                                             <p:txEl>
-                                              <p:pRg st="4" end="4"/>
+                                              <p:pRg st="3" end="3"/>
                                             </p:txEl>
                                           </p:spTgt>
                                         </p:tgtEl>
@@ -4490,26 +4537,8 @@
                                   </p:childTnLst>
                                 </p:cTn>
                               </p:par>
-                            </p:childTnLst>
-                          </p:cTn>
-                        </p:par>
-                      </p:childTnLst>
-                    </p:cTn>
-                  </p:par>
-                  <p:par>
-                    <p:cTn id="23" fill="hold">
-                      <p:stCondLst>
-                        <p:cond delay="indefinite"/>
-                      </p:stCondLst>
-                      <p:childTnLst>
-                        <p:par>
-                          <p:cTn id="24" fill="hold">
-                            <p:stCondLst>
-                              <p:cond delay="0"/>
-                            </p:stCondLst>
-                            <p:childTnLst>
                               <p:par>
-                                <p:cTn id="25" presetID="1" presetClass="entr" presetSubtype="0" fill="hold" grpId="0" nodeType="clickEffect">
+                                <p:cTn id="25" presetID="1" presetClass="entr" presetSubtype="0" fill="hold" grpId="0" nodeType="withEffect">
                                   <p:stCondLst>
                                     <p:cond delay="0"/>
                                   </p:stCondLst>
@@ -4524,7 +4553,7 @@
                                         <p:tgtEl>
                                           <p:spTgt spid="3">
                                             <p:txEl>
-                                              <p:pRg st="5" end="5"/>
+                                              <p:pRg st="10" end="10"/>
                                             </p:txEl>
                                           </p:spTgt>
                                         </p:tgtEl>
@@ -4573,7 +4602,7 @@
                                         <p:tgtEl>
                                           <p:spTgt spid="3">
                                             <p:txEl>
-                                              <p:pRg st="6" end="6"/>
+                                              <p:pRg st="4" end="4"/>
                                             </p:txEl>
                                           </p:spTgt>
                                         </p:tgtEl>
@@ -4604,69 +4633,7 @@
                                         <p:tgtEl>
                                           <p:spTgt spid="3">
                                             <p:txEl>
-                                              <p:pRg st="7" end="7"/>
-                                            </p:txEl>
-                                          </p:spTgt>
-                                        </p:tgtEl>
-                                        <p:attrNameLst>
-                                          <p:attrName>style.visibility</p:attrName>
-                                        </p:attrNameLst>
-                                      </p:cBhvr>
-                                      <p:to>
-                                        <p:strVal val="visible"/>
-                                      </p:to>
-                                    </p:set>
-                                  </p:childTnLst>
-                                </p:cTn>
-                              </p:par>
-                              <p:par>
-                                <p:cTn id="33" presetID="1" presetClass="entr" presetSubtype="0" fill="hold" grpId="0" nodeType="withEffect">
-                                  <p:stCondLst>
-                                    <p:cond delay="0"/>
-                                  </p:stCondLst>
-                                  <p:childTnLst>
-                                    <p:set>
-                                      <p:cBhvr>
-                                        <p:cTn id="34" dur="1" fill="hold">
-                                          <p:stCondLst>
-                                            <p:cond delay="0"/>
-                                          </p:stCondLst>
-                                        </p:cTn>
-                                        <p:tgtEl>
-                                          <p:spTgt spid="3">
-                                            <p:txEl>
-                                              <p:pRg st="8" end="8"/>
-                                            </p:txEl>
-                                          </p:spTgt>
-                                        </p:tgtEl>
-                                        <p:attrNameLst>
-                                          <p:attrName>style.visibility</p:attrName>
-                                        </p:attrNameLst>
-                                      </p:cBhvr>
-                                      <p:to>
-                                        <p:strVal val="visible"/>
-                                      </p:to>
-                                    </p:set>
-                                  </p:childTnLst>
-                                </p:cTn>
-                              </p:par>
-                              <p:par>
-                                <p:cTn id="35" presetID="1" presetClass="entr" presetSubtype="0" fill="hold" grpId="0" nodeType="withEffect">
-                                  <p:stCondLst>
-                                    <p:cond delay="0"/>
-                                  </p:stCondLst>
-                                  <p:childTnLst>
-                                    <p:set>
-                                      <p:cBhvr>
-                                        <p:cTn id="36" dur="1" fill="hold">
-                                          <p:stCondLst>
-                                            <p:cond delay="0"/>
-                                          </p:stCondLst>
-                                        </p:cTn>
-                                        <p:tgtEl>
-                                          <p:spTgt spid="3">
-                                            <p:txEl>
-                                              <p:pRg st="9" end="9"/>
+                                              <p:pRg st="11" end="11"/>
                                             </p:txEl>
                                           </p:spTgt>
                                         </p:tgtEl>
@@ -4688,26 +4655,26 @@
                     </p:cTn>
                   </p:par>
                   <p:par>
-                    <p:cTn id="37" fill="hold">
+                    <p:cTn id="33" fill="hold">
                       <p:stCondLst>
                         <p:cond delay="indefinite"/>
                       </p:stCondLst>
                       <p:childTnLst>
                         <p:par>
-                          <p:cTn id="38" fill="hold">
+                          <p:cTn id="34" fill="hold">
                             <p:stCondLst>
                               <p:cond delay="0"/>
                             </p:stCondLst>
                             <p:childTnLst>
                               <p:par>
-                                <p:cTn id="39" presetID="1" presetClass="entr" presetSubtype="0" fill="hold" grpId="0" nodeType="clickEffect">
+                                <p:cTn id="35" presetID="1" presetClass="entr" presetSubtype="0" fill="hold" grpId="0" nodeType="clickEffect">
                                   <p:stCondLst>
                                     <p:cond delay="0"/>
                                   </p:stCondLst>
                                   <p:childTnLst>
                                     <p:set>
                                       <p:cBhvr>
-                                        <p:cTn id="40" dur="1" fill="hold">
+                                        <p:cTn id="36" dur="1" fill="hold">
                                           <p:stCondLst>
                                             <p:cond delay="0"/>
                                           </p:stCondLst>
@@ -4715,7 +4682,7 @@
                                         <p:tgtEl>
                                           <p:spTgt spid="3">
                                             <p:txEl>
-                                              <p:pRg st="10" end="10"/>
+                                              <p:pRg st="5" end="5"/>
                                             </p:txEl>
                                           </p:spTgt>
                                         </p:tgtEl>
@@ -4731,7 +4698,56 @@
                                 </p:cTn>
                               </p:par>
                               <p:par>
-                                <p:cTn id="41" presetID="1" presetClass="entr" presetSubtype="0" fill="hold" grpId="0" nodeType="withEffect">
+                                <p:cTn id="37" presetID="1" presetClass="entr" presetSubtype="0" fill="hold" grpId="0" nodeType="withEffect">
+                                  <p:stCondLst>
+                                    <p:cond delay="0"/>
+                                  </p:stCondLst>
+                                  <p:childTnLst>
+                                    <p:set>
+                                      <p:cBhvr>
+                                        <p:cTn id="38" dur="1" fill="hold">
+                                          <p:stCondLst>
+                                            <p:cond delay="0"/>
+                                          </p:stCondLst>
+                                        </p:cTn>
+                                        <p:tgtEl>
+                                          <p:spTgt spid="3">
+                                            <p:txEl>
+                                              <p:pRg st="12" end="12"/>
+                                            </p:txEl>
+                                          </p:spTgt>
+                                        </p:tgtEl>
+                                        <p:attrNameLst>
+                                          <p:attrName>style.visibility</p:attrName>
+                                        </p:attrNameLst>
+                                      </p:cBhvr>
+                                      <p:to>
+                                        <p:strVal val="visible"/>
+                                      </p:to>
+                                    </p:set>
+                                  </p:childTnLst>
+                                </p:cTn>
+                              </p:par>
+                            </p:childTnLst>
+                          </p:cTn>
+                        </p:par>
+                      </p:childTnLst>
+                    </p:cTn>
+                  </p:par>
+                  <p:par>
+                    <p:cTn id="39" fill="hold">
+                      <p:stCondLst>
+                        <p:cond delay="indefinite"/>
+                      </p:stCondLst>
+                      <p:childTnLst>
+                        <p:par>
+                          <p:cTn id="40" fill="hold">
+                            <p:stCondLst>
+                              <p:cond delay="0"/>
+                            </p:stCondLst>
+                            <p:childTnLst>
+                              <p:par>
+                                <p:cTn id="41" presetID="1" presetClass="entr" presetSubtype="0" fill="hold" grpId="0" nodeType="clickEffect">
                                   <p:stCondLst>
                                     <p:cond delay="0"/>
                                   </p:stCondLst>
@@ -4746,7 +4762,7 @@
                                         <p:tgtEl>
                                           <p:spTgt spid="3">
                                             <p:txEl>
-                                              <p:pRg st="11" end="11"/>
+                                              <p:pRg st="6" end="6"/>
                                             </p:txEl>
                                           </p:spTgt>
                                         </p:tgtEl>
@@ -4770,37 +4786,6 @@
                                     <p:set>
                                       <p:cBhvr>
                                         <p:cTn id="44" dur="1" fill="hold">
-                                          <p:stCondLst>
-                                            <p:cond delay="0"/>
-                                          </p:stCondLst>
-                                        </p:cTn>
-                                        <p:tgtEl>
-                                          <p:spTgt spid="3">
-                                            <p:txEl>
-                                              <p:pRg st="12" end="12"/>
-                                            </p:txEl>
-                                          </p:spTgt>
-                                        </p:tgtEl>
-                                        <p:attrNameLst>
-                                          <p:attrName>style.visibility</p:attrName>
-                                        </p:attrNameLst>
-                                      </p:cBhvr>
-                                      <p:to>
-                                        <p:strVal val="visible"/>
-                                      </p:to>
-                                    </p:set>
-                                  </p:childTnLst>
-                                </p:cTn>
-                              </p:par>
-                              <p:par>
-                                <p:cTn id="45" presetID="1" presetClass="entr" presetSubtype="0" fill="hold" grpId="0" nodeType="withEffect">
-                                  <p:stCondLst>
-                                    <p:cond delay="0"/>
-                                  </p:stCondLst>
-                                  <p:childTnLst>
-                                    <p:set>
-                                      <p:cBhvr>
-                                        <p:cTn id="46" dur="1" fill="hold">
                                           <p:stCondLst>
                                             <p:cond delay="0"/>
                                           </p:stCondLst>
@@ -7002,20 +6987,20 @@
           <a:lstStyle/>
           <a:p>
             <a:r>
-              <a:rPr lang="en-US" sz="2500"/>
+              <a:rPr lang="en-US" sz="2500" dirty="0"/>
               <a:t>Committees</a:t>
             </a:r>
           </a:p>
           <a:p>
             <a:pPr lvl="1"/>
             <a:r>
-              <a:rPr lang="en-US" sz="2500"/>
+              <a:rPr lang="en-US" sz="2500" dirty="0"/>
               <a:t>Outreach, Marketing, Web Dev</a:t>
             </a:r>
           </a:p>
           <a:p>
             <a:r>
-              <a:rPr lang="en-US" sz="2500">
+              <a:rPr lang="en-US" sz="2500" dirty="0">
                 <a:solidFill>
                   <a:srgbClr val="262626"/>
                 </a:solidFill>
@@ -7024,15 +7009,18 @@
             </a:r>
           </a:p>
           <a:p>
-            <a:pPr marL="228600"/>
-            <a:endParaRPr lang="en-US" sz="2500">
-              <a:solidFill>
-                <a:srgbClr val="262626"/>
-              </a:solidFill>
-            </a:endParaRPr>
-          </a:p>
-          <a:p>
-            <a:endParaRPr lang="en-US" sz="2500">
+            <a:pPr lvl="1"/>
+            <a:r>
+              <a:rPr lang="en-US" sz="2300" dirty="0">
+                <a:solidFill>
+                  <a:srgbClr val="262626"/>
+                </a:solidFill>
+              </a:rPr>
+              <a:t>Link to follow</a:t>
+            </a:r>
+          </a:p>
+          <a:p>
+            <a:endParaRPr lang="en-US" sz="2500" dirty="0">
               <a:solidFill>
                 <a:srgbClr val="262626"/>
               </a:solidFill>
@@ -7056,7 +7044,93 @@
         <p:cTn id="1" dur="indefinite" restart="never" nodeType="tmRoot">
           <p:childTnLst>
             <p:seq concurrent="1" nextAc="seek">
-              <p:cTn id="2" dur="indefinite" nodeType="mainSeq"/>
+              <p:cTn id="2" dur="indefinite" nodeType="mainSeq">
+                <p:childTnLst>
+                  <p:par>
+                    <p:cTn id="3" fill="hold">
+                      <p:stCondLst>
+                        <p:cond delay="indefinite"/>
+                        <p:cond evt="onBegin" delay="0">
+                          <p:tn val="2"/>
+                        </p:cond>
+                      </p:stCondLst>
+                      <p:childTnLst>
+                        <p:par>
+                          <p:cTn id="4" fill="hold">
+                            <p:stCondLst>
+                              <p:cond delay="0"/>
+                            </p:stCondLst>
+                            <p:childTnLst>
+                              <p:par>
+                                <p:cTn id="5" presetID="1" presetClass="entr" presetSubtype="0" fill="hold" grpId="0" nodeType="withEffect">
+                                  <p:stCondLst>
+                                    <p:cond delay="0"/>
+                                  </p:stCondLst>
+                                  <p:childTnLst>
+                                    <p:set>
+                                      <p:cBhvr>
+                                        <p:cTn id="6" dur="1" fill="hold">
+                                          <p:stCondLst>
+                                            <p:cond delay="0"/>
+                                          </p:stCondLst>
+                                        </p:cTn>
+                                        <p:tgtEl>
+                                          <p:spTgt spid="3">
+                                            <p:txEl>
+                                              <p:pRg st="0" end="0"/>
+                                            </p:txEl>
+                                          </p:spTgt>
+                                        </p:tgtEl>
+                                        <p:attrNameLst>
+                                          <p:attrName>style.visibility</p:attrName>
+                                        </p:attrNameLst>
+                                      </p:cBhvr>
+                                      <p:to>
+                                        <p:strVal val="visible"/>
+                                      </p:to>
+                                    </p:set>
+                                  </p:childTnLst>
+                                </p:cTn>
+                              </p:par>
+                              <p:par>
+                                <p:cTn id="7" presetID="1" presetClass="entr" presetSubtype="0" fill="hold" grpId="0" nodeType="withEffect">
+                                  <p:stCondLst>
+                                    <p:cond delay="0"/>
+                                  </p:stCondLst>
+                                  <p:childTnLst>
+                                    <p:set>
+                                      <p:cBhvr>
+                                        <p:cTn id="8" dur="1" fill="hold">
+                                          <p:stCondLst>
+                                            <p:cond delay="0"/>
+                                          </p:stCondLst>
+                                        </p:cTn>
+                                        <p:tgtEl>
+                                          <p:spTgt spid="3">
+                                            <p:txEl>
+                                              <p:pRg st="1" end="1"/>
+                                            </p:txEl>
+                                          </p:spTgt>
+                                        </p:tgtEl>
+                                        <p:attrNameLst>
+                                          <p:attrName>style.visibility</p:attrName>
+                                        </p:attrNameLst>
+                                      </p:cBhvr>
+                                      <p:to>
+                                        <p:strVal val="visible"/>
+                                      </p:to>
+                                    </p:set>
+                                  </p:childTnLst>
+                                </p:cTn>
+                              </p:par>
+                            </p:childTnLst>
+                          </p:cTn>
+                        </p:par>
+                      </p:childTnLst>
+                    </p:cTn>
+                  </p:par>
+                </p:childTnLst>
+              </p:cTn>
               <p:prevCondLst>
                 <p:cond evt="onPrev" delay="0">
                   <p:tgtEl>
@@ -7076,6 +7150,9 @@
         </p:cTn>
       </p:par>
     </p:tnLst>
+    <p:bldLst>
+      <p:bldP spid="3" grpId="0" uiExpand="1" build="p"/>
+    </p:bldLst>
   </p:timing>
 </p:sld>
 </file>
@@ -7149,19 +7226,19 @@
           <a:lstStyle/>
           <a:p>
             <a:r>
-              <a:rPr lang="en-US" sz="2500">
+              <a:rPr lang="en-US" sz="2500" dirty="0">
                 <a:solidFill>
                   <a:srgbClr val="262626"/>
                 </a:solidFill>
               </a:rPr>
               <a:t>Wednesday we'll send an email to everyone who's filled out an interest form</a:t>
             </a:r>
-            <a:endParaRPr lang="en-US" sz="2500"/>
+            <a:endParaRPr lang="en-US" sz="2500" dirty="0"/>
           </a:p>
           <a:p>
             <a:pPr lvl="1"/>
             <a:r>
-              <a:rPr lang="en-US" sz="2500">
+              <a:rPr lang="en-US" sz="2500" dirty="0">
                 <a:solidFill>
                   <a:srgbClr val="262626"/>
                 </a:solidFill>
@@ -7172,14 +7249,14 @@
           <a:p>
             <a:pPr lvl="1"/>
             <a:r>
-              <a:rPr lang="en-US" sz="2500">
+              <a:rPr lang="en-US" sz="2500" dirty="0">
                 <a:solidFill>
                   <a:srgbClr val="262626"/>
                 </a:solidFill>
               </a:rPr>
-              <a:t>Meeting every other week (opposite from meeting weeks)</a:t>
-            </a:r>
-            <a:endParaRPr lang="en-US" sz="2500">
+              <a:t>Meet every other week (opposite from GBM weeks)</a:t>
+            </a:r>
+            <a:endParaRPr lang="en-US" sz="2500" dirty="0">
               <a:solidFill>
                 <a:schemeClr val="tx1"/>
               </a:solidFill>
@@ -7188,7 +7265,7 @@
           <a:p>
             <a:pPr lvl="1"/>
             <a:r>
-              <a:rPr lang="en-US" sz="2500">
+              <a:rPr lang="en-US" sz="2500" dirty="0">
                 <a:solidFill>
                   <a:srgbClr val="262626"/>
                 </a:solidFill>
@@ -7197,14 +7274,14 @@
             </a:r>
           </a:p>
           <a:p>
-            <a:endParaRPr lang="en-US" sz="2500">
+            <a:endParaRPr lang="en-US" sz="2500" dirty="0">
               <a:solidFill>
                 <a:srgbClr val="262626"/>
               </a:solidFill>
             </a:endParaRPr>
           </a:p>
           <a:p>
-            <a:endParaRPr lang="en-US" sz="2500">
+            <a:endParaRPr lang="en-US" sz="2500" dirty="0">
               <a:solidFill>
                 <a:srgbClr val="262626"/>
               </a:solidFill>
@@ -7321,19 +7398,19 @@
           <a:lstStyle/>
           <a:p>
             <a:r>
-              <a:rPr lang="en-US"/>
+              <a:rPr lang="en-US" dirty="0"/>
               <a:t>Interested in joining a committee? Sign up here!</a:t>
             </a:r>
           </a:p>
           <a:p>
             <a:pPr lvl="1"/>
             <a:r>
-              <a:rPr lang="en-US" sz="3600">
+              <a:rPr lang="en-US" sz="3600" dirty="0">
                 <a:hlinkClick r:id="rId2"/>
               </a:rPr>
               <a:t>http://bit.ly/interestACMW</a:t>
             </a:r>
-            <a:endParaRPr lang="en-US" sz="3600">
+            <a:endParaRPr lang="en-US" sz="3600" dirty="0">
               <a:solidFill>
                 <a:schemeClr val="tx1"/>
               </a:solidFill>
@@ -7342,10 +7419,10 @@
           </a:p>
           <a:p>
             <a:r>
-              <a:rPr lang="en-US"/>
+              <a:rPr lang="en-US" dirty="0"/>
               <a:t>Sign up for our email list here!</a:t>
             </a:r>
-            <a:endParaRPr lang="en-US">
+            <a:endParaRPr lang="en-US" dirty="0">
               <a:solidFill>
                 <a:srgbClr val="000000"/>
               </a:solidFill>
@@ -7354,29 +7431,29 @@
           <a:p>
             <a:pPr lvl="1"/>
             <a:r>
-              <a:rPr lang="en-US" sz="3600">
+              <a:rPr lang="en-US" sz="3600" dirty="0">
                 <a:hlinkClick r:id="rId3"/>
               </a:rPr>
               <a:t>http://bit.ly/email</a:t>
             </a:r>
             <a:r>
-              <a:rPr lang="en-US" sz="3600">
+              <a:rPr lang="en-US" sz="3600" dirty="0">
                 <a:hlinkClick r:id="rId4"/>
               </a:rPr>
               <a:t>ACMW</a:t>
             </a:r>
-            <a:endParaRPr lang="en-US" sz="3600"/>
-          </a:p>
-          <a:p>
-            <a:r>
-              <a:rPr lang="en-US"/>
-              <a:t>Interested in joining a committee? Sign up here!</a:t>
+            <a:endParaRPr lang="en-US" sz="3600" dirty="0"/>
+          </a:p>
+          <a:p>
+            <a:r>
+              <a:rPr lang="en-US" dirty="0"/>
+              <a:t>Missed the meeting sign-in link? Sign in here!</a:t>
             </a:r>
           </a:p>
           <a:p>
             <a:pPr lvl="1"/>
             <a:r>
-              <a:rPr lang="en-US" sz="3600">
+              <a:rPr lang="en-US" sz="3600" dirty="0">
                 <a:hlinkClick r:id="rId5"/>
               </a:rPr>
               <a:t>http://bit.ly/signinACMW</a:t>

</xml_diff>